<commit_message>
continued write up and started presentation
</commit_message>
<xml_diff>
--- a/Presentation.pptx
+++ b/Presentation.pptx
@@ -271,7 +271,7 @@
           <a:p>
             <a:fld id="{085C4363-0C8D-4048-885D-EDEB801BB229}" type="datetimeFigureOut">
               <a:rPr lang="en-US" smtClean="0"/>
-              <a:t>11/19/2021</a:t>
+              <a:t>11/28/2021</a:t>
             </a:fld>
             <a:endParaRPr lang="en-US"/>
           </a:p>
@@ -469,7 +469,7 @@
           <a:p>
             <a:fld id="{085C4363-0C8D-4048-885D-EDEB801BB229}" type="datetimeFigureOut">
               <a:rPr lang="en-US" smtClean="0"/>
-              <a:t>11/19/2021</a:t>
+              <a:t>11/28/2021</a:t>
             </a:fld>
             <a:endParaRPr lang="en-US"/>
           </a:p>
@@ -677,7 +677,7 @@
           <a:p>
             <a:fld id="{085C4363-0C8D-4048-885D-EDEB801BB229}" type="datetimeFigureOut">
               <a:rPr lang="en-US" smtClean="0"/>
-              <a:t>11/19/2021</a:t>
+              <a:t>11/28/2021</a:t>
             </a:fld>
             <a:endParaRPr lang="en-US"/>
           </a:p>
@@ -875,7 +875,7 @@
           <a:p>
             <a:fld id="{085C4363-0C8D-4048-885D-EDEB801BB229}" type="datetimeFigureOut">
               <a:rPr lang="en-US" smtClean="0"/>
-              <a:t>11/19/2021</a:t>
+              <a:t>11/28/2021</a:t>
             </a:fld>
             <a:endParaRPr lang="en-US"/>
           </a:p>
@@ -1150,7 +1150,7 @@
           <a:p>
             <a:fld id="{085C4363-0C8D-4048-885D-EDEB801BB229}" type="datetimeFigureOut">
               <a:rPr lang="en-US" smtClean="0"/>
-              <a:t>11/19/2021</a:t>
+              <a:t>11/28/2021</a:t>
             </a:fld>
             <a:endParaRPr lang="en-US"/>
           </a:p>
@@ -1415,7 +1415,7 @@
           <a:p>
             <a:fld id="{085C4363-0C8D-4048-885D-EDEB801BB229}" type="datetimeFigureOut">
               <a:rPr lang="en-US" smtClean="0"/>
-              <a:t>11/19/2021</a:t>
+              <a:t>11/28/2021</a:t>
             </a:fld>
             <a:endParaRPr lang="en-US"/>
           </a:p>
@@ -1827,7 +1827,7 @@
           <a:p>
             <a:fld id="{085C4363-0C8D-4048-885D-EDEB801BB229}" type="datetimeFigureOut">
               <a:rPr lang="en-US" smtClean="0"/>
-              <a:t>11/19/2021</a:t>
+              <a:t>11/28/2021</a:t>
             </a:fld>
             <a:endParaRPr lang="en-US"/>
           </a:p>
@@ -1968,7 +1968,7 @@
           <a:p>
             <a:fld id="{085C4363-0C8D-4048-885D-EDEB801BB229}" type="datetimeFigureOut">
               <a:rPr lang="en-US" smtClean="0"/>
-              <a:t>11/19/2021</a:t>
+              <a:t>11/28/2021</a:t>
             </a:fld>
             <a:endParaRPr lang="en-US"/>
           </a:p>
@@ -2081,7 +2081,7 @@
           <a:p>
             <a:fld id="{085C4363-0C8D-4048-885D-EDEB801BB229}" type="datetimeFigureOut">
               <a:rPr lang="en-US" smtClean="0"/>
-              <a:t>11/19/2021</a:t>
+              <a:t>11/28/2021</a:t>
             </a:fld>
             <a:endParaRPr lang="en-US"/>
           </a:p>
@@ -2392,7 +2392,7 @@
           <a:p>
             <a:fld id="{085C4363-0C8D-4048-885D-EDEB801BB229}" type="datetimeFigureOut">
               <a:rPr lang="en-US" smtClean="0"/>
-              <a:t>11/19/2021</a:t>
+              <a:t>11/28/2021</a:t>
             </a:fld>
             <a:endParaRPr lang="en-US"/>
           </a:p>
@@ -2680,7 +2680,7 @@
           <a:p>
             <a:fld id="{085C4363-0C8D-4048-885D-EDEB801BB229}" type="datetimeFigureOut">
               <a:rPr lang="en-US" smtClean="0"/>
-              <a:t>11/19/2021</a:t>
+              <a:t>11/28/2021</a:t>
             </a:fld>
             <a:endParaRPr lang="en-US"/>
           </a:p>
@@ -2921,7 +2921,7 @@
           <a:p>
             <a:fld id="{085C4363-0C8D-4048-885D-EDEB801BB229}" type="datetimeFigureOut">
               <a:rPr lang="en-US" smtClean="0"/>
-              <a:t>11/19/2021</a:t>
+              <a:t>11/28/2021</a:t>
             </a:fld>
             <a:endParaRPr lang="en-US"/>
           </a:p>
@@ -3356,12 +3356,14 @@
         </p:nvSpPr>
         <p:spPr/>
         <p:txBody>
-          <a:bodyPr/>
+          <a:bodyPr>
+            <a:normAutofit fontScale="90000"/>
+          </a:bodyPr>
           <a:lstStyle/>
           <a:p>
             <a:r>
               <a:rPr lang="en-US" dirty="0"/>
-              <a:t>Title</a:t>
+              <a:t>Finding a model to predict total cholesterol level without lab data</a:t>
             </a:r>
           </a:p>
         </p:txBody>
@@ -3677,6 +3679,75 @@
           <a:bodyPr/>
           <a:lstStyle/>
           <a:p>
+            <a:r>
+              <a:rPr lang="en-US" b="0" i="0" u="sng" dirty="0">
+                <a:solidFill>
+                  <a:srgbClr val="1A466C"/>
+                </a:solidFill>
+                <a:effectLst/>
+                <a:latin typeface="Helvetica Neue"/>
+                <a:hlinkClick r:id="rId2"/>
+              </a:rPr>
+              <a:t>https://www.washingtonpost.com/health/cholesterol-level-young-adults/2020/09/04/6a1f1f4c-ed81-11ea-b4bc-3a2098fc73d4_story.html</a:t>
+            </a:r>
+            <a:endParaRPr lang="en-US" b="0" i="0" u="sng" dirty="0">
+              <a:solidFill>
+                <a:srgbClr val="1A466C"/>
+              </a:solidFill>
+              <a:effectLst/>
+              <a:latin typeface="Helvetica Neue"/>
+            </a:endParaRPr>
+          </a:p>
+          <a:p>
+            <a:r>
+              <a:rPr lang="en-US" b="0" i="0" u="sng" dirty="0">
+                <a:solidFill>
+                  <a:srgbClr val="296EAA"/>
+                </a:solidFill>
+                <a:effectLst/>
+                <a:latin typeface="Helvetica Neue"/>
+                <a:hlinkClick r:id="rId3"/>
+              </a:rPr>
+              <a:t>https://www.webmd.com/heart-disease/default.htm</a:t>
+            </a:r>
+            <a:endParaRPr lang="en-US" b="0" i="0" dirty="0">
+              <a:solidFill>
+                <a:srgbClr val="000000"/>
+              </a:solidFill>
+              <a:effectLst/>
+              <a:latin typeface="Helvetica Neue"/>
+            </a:endParaRPr>
+          </a:p>
+          <a:p>
+            <a:r>
+              <a:rPr lang="en-US" b="0" i="0" dirty="0">
+                <a:solidFill>
+                  <a:srgbClr val="000000"/>
+                </a:solidFill>
+                <a:effectLst/>
+                <a:latin typeface="Helvetica Neue"/>
+                <a:hlinkClick r:id="rId4"/>
+              </a:rPr>
+              <a:t>https://www.webmd.com/cholesterol-management/default.htm</a:t>
+            </a:r>
+            <a:endParaRPr lang="en-US" b="0" i="0" dirty="0">
+              <a:solidFill>
+                <a:srgbClr val="000000"/>
+              </a:solidFill>
+              <a:effectLst/>
+              <a:latin typeface="Helvetica Neue"/>
+            </a:endParaRPr>
+          </a:p>
+          <a:p>
+            <a:endParaRPr lang="en-US" b="0" i="0" dirty="0">
+              <a:solidFill>
+                <a:srgbClr val="000000"/>
+              </a:solidFill>
+              <a:effectLst/>
+              <a:latin typeface="Helvetica Neue"/>
+            </a:endParaRPr>
+          </a:p>
+          <a:p>
             <a:endParaRPr lang="en-US" dirty="0"/>
           </a:p>
         </p:txBody>
@@ -3857,7 +3928,9 @@
         </p:nvSpPr>
         <p:spPr/>
         <p:txBody>
-          <a:bodyPr/>
+          <a:bodyPr>
+            <a:normAutofit/>
+          </a:bodyPr>
           <a:lstStyle/>
           <a:p>
             <a:r>
@@ -3870,7 +3943,80 @@
               </a:rPr>
               <a:t>Information of what got you here and why we are here, give us something that is worth looking into.</a:t>
             </a:r>
-            <a:endParaRPr lang="en-US" dirty="0"/>
+          </a:p>
+          <a:p>
+            <a:r>
+              <a:rPr lang="en-US" sz="1800" dirty="0">
+                <a:solidFill>
+                  <a:srgbClr val="000000"/>
+                </a:solidFill>
+                <a:latin typeface="Arial" panose="020B0604020202020204" pitchFamily="34" charset="0"/>
+              </a:rPr>
+              <a:t>Nearly 1 in 3 Americans have high cholesterol. 1</a:t>
+            </a:r>
+          </a:p>
+          <a:p>
+            <a:r>
+              <a:rPr lang="en-US" sz="1800" b="0" i="0" u="none" strike="noStrike" dirty="0">
+                <a:solidFill>
+                  <a:srgbClr val="000000"/>
+                </a:solidFill>
+                <a:effectLst/>
+                <a:latin typeface="Arial" panose="020B0604020202020204" pitchFamily="34" charset="0"/>
+              </a:rPr>
+              <a:t>According to the dataset u</a:t>
+            </a:r>
+            <a:r>
+              <a:rPr lang="en-US" sz="1800" dirty="0">
+                <a:solidFill>
+                  <a:srgbClr val="000000"/>
+                </a:solidFill>
+                <a:latin typeface="Arial" panose="020B0604020202020204" pitchFamily="34" charset="0"/>
+              </a:rPr>
+              <a:t>sed, over half of those with high cholesterol have never been told by a health professional they have high cholesterol</a:t>
+            </a:r>
+          </a:p>
+          <a:p>
+            <a:r>
+              <a:rPr lang="en-US" sz="1800" b="0" i="0" u="none" strike="noStrike" dirty="0">
+                <a:solidFill>
+                  <a:srgbClr val="000000"/>
+                </a:solidFill>
+                <a:effectLst/>
+                <a:latin typeface="Arial" panose="020B0604020202020204" pitchFamily="34" charset="0"/>
+              </a:rPr>
+              <a:t>High </a:t>
+            </a:r>
+            <a:r>
+              <a:rPr lang="en-US" sz="1800" dirty="0">
+                <a:solidFill>
+                  <a:srgbClr val="000000"/>
+                </a:solidFill>
+                <a:latin typeface="Arial" panose="020B0604020202020204" pitchFamily="34" charset="0"/>
+              </a:rPr>
+              <a:t>cholesterol is a major risk factor for heart disease, the leading cause of death of men and women in America. 2,3</a:t>
+            </a:r>
+            <a:endParaRPr lang="en-US" sz="1800" b="0" i="0" u="none" strike="noStrike" dirty="0">
+              <a:solidFill>
+                <a:srgbClr val="000000"/>
+              </a:solidFill>
+              <a:effectLst/>
+              <a:latin typeface="Arial" panose="020B0604020202020204" pitchFamily="34" charset="0"/>
+            </a:endParaRPr>
+          </a:p>
+          <a:p>
+            <a:r>
+              <a:rPr lang="en-US" sz="1800" dirty="0"/>
+              <a:t>With fitness trackers that can track activity, pulse, blood pressure and health apps that can track nutrition, models can be created to predict cholesterol level </a:t>
+            </a:r>
+            <a:r>
+              <a:rPr lang="en-US" sz="1800" dirty="0">
+                <a:solidFill>
+                  <a:schemeClr val="tx2"/>
+                </a:solidFill>
+              </a:rPr>
+              <a:t>(may want to move this to introduction)</a:t>
+            </a:r>
           </a:p>
         </p:txBody>
       </p:sp>

</xml_diff>

<commit_message>
started working on presentation
</commit_message>
<xml_diff>
--- a/Presentation.pptx
+++ b/Presentation.pptx
@@ -3589,6 +3589,26 @@
               </a:rPr>
               <a:t>Take-home things that are actionable and will help move the needle forward.</a:t>
             </a:r>
+          </a:p>
+          <a:p>
+            <a:r>
+              <a:rPr lang="en-US" sz="1800" dirty="0">
+                <a:solidFill>
+                  <a:srgbClr val="000000"/>
+                </a:solidFill>
+                <a:latin typeface="Arial" panose="020B0604020202020204" pitchFamily="34" charset="0"/>
+              </a:rPr>
+              <a:t>Any health app that uses this model will need to retrain and hence ask users if they have had their cholesterol checked, and if so, what their total cholesterol </a:t>
+            </a:r>
+            <a:r>
+              <a:rPr lang="en-US" sz="1800">
+                <a:solidFill>
+                  <a:srgbClr val="000000"/>
+                </a:solidFill>
+                <a:latin typeface="Arial" panose="020B0604020202020204" pitchFamily="34" charset="0"/>
+              </a:rPr>
+              <a:t>level was.</a:t>
+            </a:r>
             <a:endParaRPr lang="en-US" dirty="0"/>
           </a:p>
         </p:txBody>

</xml_diff>